<commit_message>
Document Kernel & Application Link (.fso and .fo)
- Keep the PDG Multi-Sandbox section only for KF platform configuration
- Add to KDG
	- Kernel Linking & Application Linking Sections
	- Document Kernel Metadata Generator
	- Move Firmware Linker from PDG->KDG + refresh
	- Document Off board and on Device Linking
- Integrate schematics originally from
'OnBoardSoarOptimizerPresentation.pptx'
</commit_message>
<xml_diff>
--- a/KernelDeveloperGuide/pptx/build_flow_zoom_workspace.pptx
+++ b/KernelDeveloperGuide/pptx/build_flow_zoom_workspace.pptx
@@ -5,13 +5,15 @@
     <p:sldMasterId id="2147483695" r:id="rId1"/>
   </p:sldMasterIdLst>
   <p:notesMasterIdLst>
-    <p:notesMasterId r:id="rId3"/>
+    <p:notesMasterId r:id="rId5"/>
   </p:notesMasterIdLst>
   <p:handoutMasterIdLst>
-    <p:handoutMasterId r:id="rId4"/>
+    <p:handoutMasterId r:id="rId6"/>
   </p:handoutMasterIdLst>
   <p:sldIdLst>
     <p:sldId id="404" r:id="rId2"/>
+    <p:sldId id="405" r:id="rId3"/>
+    <p:sldId id="406" r:id="rId4"/>
   </p:sldIdLst>
   <p:sldSz cx="9144000" cy="6858000" type="screen4x3"/>
   <p:notesSz cx="6858000" cy="9144000"/>
@@ -5262,7 +5264,15 @@
             </a:pPr>
             <a:r>
               <a:rPr lang="en-US" sz="1000" dirty="0" smtClean="0"/>
-              <a:t>(Kernel + Resident Application)</a:t>
+              <a:t>(Kernel + </a:t>
+            </a:r>
+            <a:r>
+              <a:rPr lang="en-US" sz="1000" dirty="0" smtClean="0"/>
+              <a:t>System Application</a:t>
+            </a:r>
+            <a:r>
+              <a:rPr lang="en-US" sz="1000" dirty="0" smtClean="0"/>
+              <a:t>)</a:t>
             </a:r>
           </a:p>
         </p:txBody>
@@ -5314,6 +5324,1164 @@
     <p:extLst>
       <p:ext uri="{BB962C8B-B14F-4D97-AF65-F5344CB8AC3E}">
         <p14:creationId xmlns:p14="http://schemas.microsoft.com/office/powerpoint/2010/main" val="2041259384"/>
+      </p:ext>
+    </p:extLst>
+  </p:cSld>
+  <p:clrMapOvr>
+    <a:masterClrMapping/>
+  </p:clrMapOvr>
+  <p:timing>
+    <p:tnLst>
+      <p:par>
+        <p:cTn id="1" dur="indefinite" restart="never" nodeType="tmRoot"/>
+      </p:par>
+    </p:tnLst>
+  </p:timing>
+</p:sld>
+</file>
+
+<file path=ppt/slides/slide2.xml><?xml version="1.0" encoding="utf-8"?>
+<p:sld xmlns:a="http://schemas.openxmlformats.org/drawingml/2006/main" xmlns:r="http://schemas.openxmlformats.org/officeDocument/2006/relationships" xmlns:p="http://schemas.openxmlformats.org/presentationml/2006/main">
+  <p:cSld>
+    <p:spTree>
+      <p:nvGrpSpPr>
+        <p:cNvPr id="1" name=""/>
+        <p:cNvGrpSpPr/>
+        <p:nvPr/>
+      </p:nvGrpSpPr>
+      <p:grpSpPr>
+        <a:xfrm>
+          <a:off x="0" y="0"/>
+          <a:ext cx="0" cy="0"/>
+          <a:chOff x="0" y="0"/>
+          <a:chExt cx="0" cy="0"/>
+        </a:xfrm>
+      </p:grpSpPr>
+      <p:sp>
+        <p:nvSpPr>
+          <p:cNvPr id="2" name="Date Placeholder 1"/>
+          <p:cNvSpPr>
+            <a:spLocks noGrp="1"/>
+          </p:cNvSpPr>
+          <p:nvPr>
+            <p:ph type="dt" sz="half" idx="2"/>
+          </p:nvPr>
+        </p:nvSpPr>
+        <p:spPr>
+          <a:xfrm>
+            <a:off x="457200" y="6286666"/>
+            <a:ext cx="1944216" cy="268139"/>
+          </a:xfrm>
+        </p:spPr>
+        <p:txBody>
+          <a:bodyPr/>
+          <a:lstStyle/>
+          <a:p>
+            <a:r>
+              <a:rPr lang="fr-FR" smtClean="0"/>
+              <a:t>Apr. 17</a:t>
+            </a:r>
+            <a:endParaRPr lang="en-US" dirty="0"/>
+          </a:p>
+        </p:txBody>
+      </p:sp>
+      <p:sp>
+        <p:nvSpPr>
+          <p:cNvPr id="3" name="Slide Number Placeholder 2"/>
+          <p:cNvSpPr>
+            <a:spLocks noGrp="1"/>
+          </p:cNvSpPr>
+          <p:nvPr>
+            <p:ph type="sldNum" sz="quarter" idx="4"/>
+          </p:nvPr>
+        </p:nvSpPr>
+        <p:spPr/>
+        <p:txBody>
+          <a:bodyPr/>
+          <a:lstStyle/>
+          <a:p>
+            <a:fld id="{23812E9D-E9B0-4B65-9D5D-15A6863C0BC0}" type="slidenum">
+              <a:rPr lang="fr-FR" smtClean="0"/>
+              <a:pPr/>
+              <a:t>2</a:t>
+            </a:fld>
+            <a:endParaRPr lang="fr-FR" dirty="0"/>
+          </a:p>
+        </p:txBody>
+      </p:sp>
+      <p:sp>
+        <p:nvSpPr>
+          <p:cNvPr id="4" name="Rounded Rectangle 3"/>
+          <p:cNvSpPr/>
+          <p:nvPr/>
+        </p:nvSpPr>
+        <p:spPr>
+          <a:xfrm>
+            <a:off x="2017033" y="1975777"/>
+            <a:ext cx="2038102" cy="1043461"/>
+          </a:xfrm>
+          <a:prstGeom prst="roundRect">
+            <a:avLst/>
+          </a:prstGeom>
+          <a:ln/>
+        </p:spPr>
+        <p:style>
+          <a:lnRef idx="2">
+            <a:schemeClr val="dk1"/>
+          </a:lnRef>
+          <a:fillRef idx="1">
+            <a:schemeClr val="lt1"/>
+          </a:fillRef>
+          <a:effectRef idx="0">
+            <a:schemeClr val="dk1"/>
+          </a:effectRef>
+          <a:fontRef idx="minor">
+            <a:schemeClr val="dk1"/>
+          </a:fontRef>
+        </p:style>
+        <p:txBody>
+          <a:bodyPr rtlCol="0" anchor="t"/>
+          <a:lstStyle/>
+          <a:p>
+            <a:pPr algn="ctr"/>
+            <a:r>
+              <a:rPr lang="en-US" sz="1200" dirty="0" err="1" smtClean="0"/>
+              <a:t>MicroEJ</a:t>
+            </a:r>
+            <a:r>
+              <a:rPr lang="en-US" sz="1200" dirty="0" smtClean="0"/>
+              <a:t> Application Project </a:t>
+            </a:r>
+          </a:p>
+          <a:p>
+            <a:pPr algn="ctr"/>
+            <a:r>
+              <a:rPr lang="en-US" sz="1000" dirty="0" smtClean="0"/>
+              <a:t>(.class files)</a:t>
+            </a:r>
+          </a:p>
+        </p:txBody>
+      </p:sp>
+      <p:sp>
+        <p:nvSpPr>
+          <p:cNvPr id="5" name="Rounded Rectangle 4"/>
+          <p:cNvSpPr/>
+          <p:nvPr/>
+        </p:nvSpPr>
+        <p:spPr>
+          <a:xfrm>
+            <a:off x="4292518" y="1975777"/>
+            <a:ext cx="2063568" cy="1043461"/>
+          </a:xfrm>
+          <a:prstGeom prst="roundRect">
+            <a:avLst/>
+          </a:prstGeom>
+          <a:ln/>
+        </p:spPr>
+        <p:style>
+          <a:lnRef idx="2">
+            <a:schemeClr val="dk1"/>
+          </a:lnRef>
+          <a:fillRef idx="1">
+            <a:schemeClr val="lt1"/>
+          </a:fillRef>
+          <a:effectRef idx="0">
+            <a:schemeClr val="dk1"/>
+          </a:effectRef>
+          <a:fontRef idx="minor">
+            <a:schemeClr val="dk1"/>
+          </a:fontRef>
+        </p:style>
+        <p:txBody>
+          <a:bodyPr rtlCol="0" anchor="ctr"/>
+          <a:lstStyle/>
+          <a:p>
+            <a:pPr algn="ctr"/>
+            <a:r>
+              <a:rPr lang="en-US" sz="1200" dirty="0" smtClean="0"/>
+              <a:t>Kernel binary</a:t>
+            </a:r>
+          </a:p>
+          <a:p>
+            <a:pPr algn="ctr">
+              <a:lnSpc>
+                <a:spcPct val="150000"/>
+              </a:lnSpc>
+            </a:pPr>
+            <a:r>
+              <a:rPr lang="en-US" sz="1000" dirty="0" smtClean="0"/>
+              <a:t>(ELF </a:t>
+            </a:r>
+            <a:r>
+              <a:rPr lang="en-US" sz="1000" dirty="0"/>
+              <a:t>executable </a:t>
+            </a:r>
+          </a:p>
+          <a:p>
+            <a:pPr algn="ctr">
+              <a:lnSpc>
+                <a:spcPct val="150000"/>
+              </a:lnSpc>
+            </a:pPr>
+            <a:r>
+              <a:rPr lang="en-US" sz="1000" dirty="0"/>
+              <a:t>with debug </a:t>
+            </a:r>
+            <a:r>
+              <a:rPr lang="en-US" sz="1000" dirty="0" err="1" smtClean="0"/>
+              <a:t>informations</a:t>
+            </a:r>
+            <a:r>
+              <a:rPr lang="en-US" sz="1000" dirty="0" smtClean="0"/>
+              <a:t>)</a:t>
+            </a:r>
+          </a:p>
+          <a:p>
+            <a:pPr algn="ctr">
+              <a:lnSpc>
+                <a:spcPct val="150000"/>
+              </a:lnSpc>
+            </a:pPr>
+            <a:r>
+              <a:rPr lang="en-US" sz="1200" dirty="0" err="1" smtClean="0">
+                <a:latin typeface="Consolas" panose="020B0609020204030204" pitchFamily="49" charset="0"/>
+              </a:rPr>
+              <a:t>kernel.out</a:t>
+            </a:r>
+            <a:endParaRPr lang="en-US" sz="1200" dirty="0" smtClean="0">
+              <a:latin typeface="Consolas" panose="020B0609020204030204" pitchFamily="49" charset="0"/>
+            </a:endParaRPr>
+          </a:p>
+        </p:txBody>
+      </p:sp>
+      <p:sp>
+        <p:nvSpPr>
+          <p:cNvPr id="6" name="Rounded Rectangle 5"/>
+          <p:cNvSpPr/>
+          <p:nvPr/>
+        </p:nvSpPr>
+        <p:spPr>
+          <a:xfrm>
+            <a:off x="3033033" y="3443501"/>
+            <a:ext cx="2221024" cy="1162251"/>
+          </a:xfrm>
+          <a:prstGeom prst="roundRect">
+            <a:avLst>
+              <a:gd name="adj" fmla="val 0"/>
+            </a:avLst>
+          </a:prstGeom>
+          <a:ln w="12700"/>
+        </p:spPr>
+        <p:style>
+          <a:lnRef idx="2">
+            <a:schemeClr val="dk1"/>
+          </a:lnRef>
+          <a:fillRef idx="1">
+            <a:schemeClr val="lt1"/>
+          </a:fillRef>
+          <a:effectRef idx="0">
+            <a:schemeClr val="dk1"/>
+          </a:effectRef>
+          <a:fontRef idx="minor">
+            <a:schemeClr val="dk1"/>
+          </a:fontRef>
+        </p:style>
+        <p:txBody>
+          <a:bodyPr rtlCol="0" anchor="t"/>
+          <a:lstStyle/>
+          <a:p>
+            <a:pPr algn="ctr"/>
+            <a:r>
+              <a:rPr lang="en-US" sz="1200" dirty="0" smtClean="0"/>
+              <a:t>Feature Build</a:t>
+            </a:r>
+          </a:p>
+          <a:p>
+            <a:pPr algn="ctr"/>
+            <a:r>
+              <a:rPr lang="en-US" sz="1000" dirty="0" smtClean="0"/>
+              <a:t>(</a:t>
+            </a:r>
+            <a:r>
+              <a:rPr lang="en-US" sz="1000" dirty="0" err="1" smtClean="0"/>
+              <a:t>MicroEJ</a:t>
+            </a:r>
+            <a:r>
+              <a:rPr lang="en-US" sz="1000" dirty="0" smtClean="0"/>
+              <a:t> </a:t>
+            </a:r>
+            <a:r>
+              <a:rPr lang="en-US" sz="1000" dirty="0"/>
+              <a:t>Application </a:t>
+            </a:r>
+            <a:r>
+              <a:rPr lang="en-US" sz="1000" dirty="0" smtClean="0"/>
+              <a:t>Launcher)</a:t>
+            </a:r>
+            <a:endParaRPr lang="en-US" sz="1000" dirty="0"/>
+          </a:p>
+          <a:p>
+            <a:pPr algn="ctr"/>
+            <a:endParaRPr lang="en-US" sz="1200" dirty="0"/>
+          </a:p>
+        </p:txBody>
+      </p:sp>
+      <p:sp>
+        <p:nvSpPr>
+          <p:cNvPr id="7" name="Down Arrow 6"/>
+          <p:cNvSpPr/>
+          <p:nvPr/>
+        </p:nvSpPr>
+        <p:spPr>
+          <a:xfrm>
+            <a:off x="4510702" y="3121321"/>
+            <a:ext cx="167575" cy="243476"/>
+          </a:xfrm>
+          <a:prstGeom prst="downArrow">
+            <a:avLst/>
+          </a:prstGeom>
+          <a:ln>
+            <a:noFill/>
+          </a:ln>
+        </p:spPr>
+        <p:style>
+          <a:lnRef idx="2">
+            <a:schemeClr val="accent1">
+              <a:shade val="50000"/>
+            </a:schemeClr>
+          </a:lnRef>
+          <a:fillRef idx="1">
+            <a:schemeClr val="accent1"/>
+          </a:fillRef>
+          <a:effectRef idx="0">
+            <a:schemeClr val="accent1"/>
+          </a:effectRef>
+          <a:fontRef idx="minor">
+            <a:schemeClr val="lt1"/>
+          </a:fontRef>
+        </p:style>
+        <p:txBody>
+          <a:bodyPr rtlCol="0" anchor="ctr"/>
+          <a:lstStyle/>
+          <a:p>
+            <a:pPr algn="ctr"/>
+            <a:endParaRPr lang="en-US"/>
+          </a:p>
+        </p:txBody>
+      </p:sp>
+      <p:pic>
+        <p:nvPicPr>
+          <p:cNvPr id="11" name="Picture 10"/>
+          <p:cNvPicPr>
+            <a:picLocks noChangeAspect="1"/>
+          </p:cNvPicPr>
+          <p:nvPr/>
+        </p:nvPicPr>
+        <p:blipFill>
+          <a:blip r:embed="rId2"/>
+          <a:stretch>
+            <a:fillRect/>
+          </a:stretch>
+        </p:blipFill>
+        <p:spPr>
+          <a:xfrm>
+            <a:off x="2354618" y="2529005"/>
+            <a:ext cx="1362932" cy="443363"/>
+          </a:xfrm>
+          <a:prstGeom prst="rect">
+            <a:avLst/>
+          </a:prstGeom>
+        </p:spPr>
+      </p:pic>
+      <p:pic>
+        <p:nvPicPr>
+          <p:cNvPr id="13" name="Picture 12"/>
+          <p:cNvPicPr>
+            <a:picLocks noChangeAspect="1"/>
+          </p:cNvPicPr>
+          <p:nvPr/>
+        </p:nvPicPr>
+        <p:blipFill>
+          <a:blip r:embed="rId3"/>
+          <a:stretch>
+            <a:fillRect/>
+          </a:stretch>
+        </p:blipFill>
+        <p:spPr>
+          <a:xfrm>
+            <a:off x="3110919" y="3976650"/>
+            <a:ext cx="2065251" cy="584784"/>
+          </a:xfrm>
+          <a:prstGeom prst="rect">
+            <a:avLst/>
+          </a:prstGeom>
+        </p:spPr>
+      </p:pic>
+      <p:sp>
+        <p:nvSpPr>
+          <p:cNvPr id="15" name="Down Arrow 14"/>
+          <p:cNvSpPr/>
+          <p:nvPr/>
+        </p:nvSpPr>
+        <p:spPr>
+          <a:xfrm>
+            <a:off x="4119697" y="4695534"/>
+            <a:ext cx="167575" cy="243476"/>
+          </a:xfrm>
+          <a:prstGeom prst="downArrow">
+            <a:avLst/>
+          </a:prstGeom>
+          <a:ln>
+            <a:noFill/>
+          </a:ln>
+        </p:spPr>
+        <p:style>
+          <a:lnRef idx="2">
+            <a:schemeClr val="accent1">
+              <a:shade val="50000"/>
+            </a:schemeClr>
+          </a:lnRef>
+          <a:fillRef idx="1">
+            <a:schemeClr val="accent1"/>
+          </a:fillRef>
+          <a:effectRef idx="0">
+            <a:schemeClr val="accent1"/>
+          </a:effectRef>
+          <a:fontRef idx="minor">
+            <a:schemeClr val="lt1"/>
+          </a:fontRef>
+        </p:style>
+        <p:txBody>
+          <a:bodyPr rtlCol="0" anchor="ctr"/>
+          <a:lstStyle/>
+          <a:p>
+            <a:pPr algn="ctr"/>
+            <a:endParaRPr lang="en-US"/>
+          </a:p>
+        </p:txBody>
+      </p:sp>
+      <p:sp>
+        <p:nvSpPr>
+          <p:cNvPr id="16" name="Rounded Rectangle 15"/>
+          <p:cNvSpPr/>
+          <p:nvPr/>
+        </p:nvSpPr>
+        <p:spPr>
+          <a:xfrm>
+            <a:off x="3088204" y="4997706"/>
+            <a:ext cx="2221025" cy="879566"/>
+          </a:xfrm>
+          <a:prstGeom prst="roundRect">
+            <a:avLst/>
+          </a:prstGeom>
+          <a:ln/>
+        </p:spPr>
+        <p:style>
+          <a:lnRef idx="2">
+            <a:schemeClr val="dk1"/>
+          </a:lnRef>
+          <a:fillRef idx="1">
+            <a:schemeClr val="lt1"/>
+          </a:fillRef>
+          <a:effectRef idx="0">
+            <a:schemeClr val="dk1"/>
+          </a:effectRef>
+          <a:fontRef idx="minor">
+            <a:schemeClr val="dk1"/>
+          </a:fontRef>
+        </p:style>
+        <p:txBody>
+          <a:bodyPr rtlCol="0" anchor="t"/>
+          <a:lstStyle/>
+          <a:p>
+            <a:pPr algn="ctr"/>
+            <a:r>
+              <a:rPr lang="en-US" sz="1200" dirty="0" smtClean="0"/>
+              <a:t>Feature binary </a:t>
+            </a:r>
+            <a:r>
+              <a:rPr lang="en-US" sz="1000" dirty="0" smtClean="0"/>
+              <a:t>(Kernel specific)</a:t>
+            </a:r>
+          </a:p>
+        </p:txBody>
+      </p:sp>
+      <p:pic>
+        <p:nvPicPr>
+          <p:cNvPr id="14" name="Picture 13"/>
+          <p:cNvPicPr>
+            <a:picLocks noChangeAspect="1"/>
+          </p:cNvPicPr>
+          <p:nvPr/>
+        </p:nvPicPr>
+        <p:blipFill rotWithShape="1">
+          <a:blip r:embed="rId4"/>
+          <a:srcRect t="1" b="5043"/>
+          <a:stretch/>
+        </p:blipFill>
+        <p:spPr>
+          <a:xfrm>
+            <a:off x="3671591" y="5364976"/>
+            <a:ext cx="1054249" cy="442338"/>
+          </a:xfrm>
+          <a:prstGeom prst="rect">
+            <a:avLst/>
+          </a:prstGeom>
+        </p:spPr>
+      </p:pic>
+      <p:sp>
+        <p:nvSpPr>
+          <p:cNvPr id="23" name="Down Arrow 22"/>
+          <p:cNvSpPr/>
+          <p:nvPr/>
+        </p:nvSpPr>
+        <p:spPr>
+          <a:xfrm>
+            <a:off x="3603022" y="3115992"/>
+            <a:ext cx="167575" cy="243476"/>
+          </a:xfrm>
+          <a:prstGeom prst="downArrow">
+            <a:avLst/>
+          </a:prstGeom>
+          <a:ln>
+            <a:noFill/>
+          </a:ln>
+        </p:spPr>
+        <p:style>
+          <a:lnRef idx="2">
+            <a:schemeClr val="accent1">
+              <a:shade val="50000"/>
+            </a:schemeClr>
+          </a:lnRef>
+          <a:fillRef idx="1">
+            <a:schemeClr val="accent1"/>
+          </a:fillRef>
+          <a:effectRef idx="0">
+            <a:schemeClr val="accent1"/>
+          </a:effectRef>
+          <a:fontRef idx="minor">
+            <a:schemeClr val="lt1"/>
+          </a:fontRef>
+        </p:style>
+        <p:txBody>
+          <a:bodyPr rtlCol="0" anchor="ctr"/>
+          <a:lstStyle/>
+          <a:p>
+            <a:pPr algn="ctr"/>
+            <a:endParaRPr lang="en-US"/>
+          </a:p>
+        </p:txBody>
+      </p:sp>
+      <p:sp>
+        <p:nvSpPr>
+          <p:cNvPr id="8" name="TextBox 7"/>
+          <p:cNvSpPr txBox="1"/>
+          <p:nvPr/>
+        </p:nvSpPr>
+        <p:spPr>
+          <a:xfrm>
+            <a:off x="2123728" y="476672"/>
+            <a:ext cx="6032742" cy="461665"/>
+          </a:xfrm>
+          <a:prstGeom prst="rect">
+            <a:avLst/>
+          </a:prstGeom>
+          <a:noFill/>
+        </p:spPr>
+        <p:txBody>
+          <a:bodyPr wrap="none" rtlCol="0">
+            <a:spAutoFit/>
+          </a:bodyPr>
+          <a:lstStyle/>
+          <a:p>
+            <a:r>
+              <a:rPr lang="en-US" sz="2400" dirty="0" smtClean="0"/>
+              <a:t>build_flow_zoom_workspace_feature_only.png</a:t>
+            </a:r>
+            <a:endParaRPr lang="en-US" sz="2400" dirty="0"/>
+          </a:p>
+        </p:txBody>
+      </p:sp>
+    </p:spTree>
+    <p:extLst>
+      <p:ext uri="{BB962C8B-B14F-4D97-AF65-F5344CB8AC3E}">
+        <p14:creationId xmlns:p14="http://schemas.microsoft.com/office/powerpoint/2010/main" val="2908563371"/>
+      </p:ext>
+    </p:extLst>
+  </p:cSld>
+  <p:clrMapOvr>
+    <a:masterClrMapping/>
+  </p:clrMapOvr>
+  <p:timing>
+    <p:tnLst>
+      <p:par>
+        <p:cTn id="1" dur="indefinite" restart="never" nodeType="tmRoot"/>
+      </p:par>
+    </p:tnLst>
+  </p:timing>
+</p:sld>
+</file>
+
+<file path=ppt/slides/slide3.xml><?xml version="1.0" encoding="utf-8"?>
+<p:sld xmlns:a="http://schemas.openxmlformats.org/drawingml/2006/main" xmlns:r="http://schemas.openxmlformats.org/officeDocument/2006/relationships" xmlns:p="http://schemas.openxmlformats.org/presentationml/2006/main">
+  <p:cSld>
+    <p:spTree>
+      <p:nvGrpSpPr>
+        <p:cNvPr id="1" name=""/>
+        <p:cNvGrpSpPr/>
+        <p:nvPr/>
+      </p:nvGrpSpPr>
+      <p:grpSpPr>
+        <a:xfrm>
+          <a:off x="0" y="0"/>
+          <a:ext cx="0" cy="0"/>
+          <a:chOff x="0" y="0"/>
+          <a:chExt cx="0" cy="0"/>
+        </a:xfrm>
+      </p:grpSpPr>
+      <p:sp>
+        <p:nvSpPr>
+          <p:cNvPr id="2" name="Date Placeholder 1"/>
+          <p:cNvSpPr>
+            <a:spLocks noGrp="1"/>
+          </p:cNvSpPr>
+          <p:nvPr>
+            <p:ph type="dt" sz="half" idx="2"/>
+          </p:nvPr>
+        </p:nvSpPr>
+        <p:spPr>
+          <a:xfrm>
+            <a:off x="457200" y="6286666"/>
+            <a:ext cx="1944216" cy="268139"/>
+          </a:xfrm>
+        </p:spPr>
+        <p:txBody>
+          <a:bodyPr/>
+          <a:lstStyle/>
+          <a:p>
+            <a:r>
+              <a:rPr lang="fr-FR" smtClean="0"/>
+              <a:t>Apr. 17</a:t>
+            </a:r>
+            <a:endParaRPr lang="en-US" dirty="0"/>
+          </a:p>
+        </p:txBody>
+      </p:sp>
+      <p:sp>
+        <p:nvSpPr>
+          <p:cNvPr id="3" name="Slide Number Placeholder 2"/>
+          <p:cNvSpPr>
+            <a:spLocks noGrp="1"/>
+          </p:cNvSpPr>
+          <p:nvPr>
+            <p:ph type="sldNum" sz="quarter" idx="4"/>
+          </p:nvPr>
+        </p:nvSpPr>
+        <p:spPr/>
+        <p:txBody>
+          <a:bodyPr/>
+          <a:lstStyle/>
+          <a:p>
+            <a:fld id="{23812E9D-E9B0-4B65-9D5D-15A6863C0BC0}" type="slidenum">
+              <a:rPr lang="fr-FR" smtClean="0"/>
+              <a:pPr/>
+              <a:t>3</a:t>
+            </a:fld>
+            <a:endParaRPr lang="fr-FR" dirty="0"/>
+          </a:p>
+        </p:txBody>
+      </p:sp>
+      <p:sp>
+        <p:nvSpPr>
+          <p:cNvPr id="5" name="Rounded Rectangle 4"/>
+          <p:cNvSpPr/>
+          <p:nvPr/>
+        </p:nvSpPr>
+        <p:spPr>
+          <a:xfrm>
+            <a:off x="5292080" y="1712070"/>
+            <a:ext cx="2016224" cy="1043461"/>
+          </a:xfrm>
+          <a:prstGeom prst="roundRect">
+            <a:avLst/>
+          </a:prstGeom>
+          <a:ln/>
+        </p:spPr>
+        <p:style>
+          <a:lnRef idx="2">
+            <a:schemeClr val="dk1"/>
+          </a:lnRef>
+          <a:fillRef idx="1">
+            <a:schemeClr val="lt1"/>
+          </a:fillRef>
+          <a:effectRef idx="0">
+            <a:schemeClr val="dk1"/>
+          </a:effectRef>
+          <a:fontRef idx="minor">
+            <a:schemeClr val="dk1"/>
+          </a:fontRef>
+        </p:style>
+        <p:txBody>
+          <a:bodyPr rtlCol="0" anchor="ctr"/>
+          <a:lstStyle/>
+          <a:p>
+            <a:pPr algn="ctr"/>
+            <a:r>
+              <a:rPr lang="en-US" sz="1200" dirty="0" smtClean="0"/>
+              <a:t>Kernel binary</a:t>
+            </a:r>
+          </a:p>
+          <a:p>
+            <a:pPr algn="ctr">
+              <a:lnSpc>
+                <a:spcPct val="150000"/>
+              </a:lnSpc>
+            </a:pPr>
+            <a:r>
+              <a:rPr lang="en-US" sz="1000" dirty="0" smtClean="0"/>
+              <a:t>(ELF </a:t>
+            </a:r>
+            <a:r>
+              <a:rPr lang="en-US" sz="1000" dirty="0"/>
+              <a:t>executable </a:t>
+            </a:r>
+          </a:p>
+          <a:p>
+            <a:pPr algn="ctr">
+              <a:lnSpc>
+                <a:spcPct val="150000"/>
+              </a:lnSpc>
+            </a:pPr>
+            <a:r>
+              <a:rPr lang="en-US" sz="1000" dirty="0"/>
+              <a:t>with debug </a:t>
+            </a:r>
+            <a:r>
+              <a:rPr lang="en-US" sz="1000" dirty="0" err="1" smtClean="0"/>
+              <a:t>informations</a:t>
+            </a:r>
+            <a:r>
+              <a:rPr lang="en-US" sz="1000" dirty="0" smtClean="0"/>
+              <a:t>)</a:t>
+            </a:r>
+          </a:p>
+          <a:p>
+            <a:pPr algn="ctr">
+              <a:lnSpc>
+                <a:spcPct val="150000"/>
+              </a:lnSpc>
+            </a:pPr>
+            <a:r>
+              <a:rPr lang="en-US" sz="1200" dirty="0" err="1" smtClean="0">
+                <a:latin typeface="Consolas" panose="020B0609020204030204" pitchFamily="49" charset="0"/>
+              </a:rPr>
+              <a:t>kernel.out</a:t>
+            </a:r>
+            <a:endParaRPr lang="en-US" sz="1200" dirty="0" smtClean="0">
+              <a:latin typeface="Consolas" panose="020B0609020204030204" pitchFamily="49" charset="0"/>
+            </a:endParaRPr>
+          </a:p>
+        </p:txBody>
+      </p:sp>
+      <p:sp>
+        <p:nvSpPr>
+          <p:cNvPr id="16" name="Rounded Rectangle 15"/>
+          <p:cNvSpPr/>
+          <p:nvPr/>
+        </p:nvSpPr>
+        <p:spPr>
+          <a:xfrm>
+            <a:off x="3131840" y="1700808"/>
+            <a:ext cx="2033373" cy="1043461"/>
+          </a:xfrm>
+          <a:prstGeom prst="roundRect">
+            <a:avLst/>
+          </a:prstGeom>
+          <a:ln/>
+        </p:spPr>
+        <p:style>
+          <a:lnRef idx="2">
+            <a:schemeClr val="dk1"/>
+          </a:lnRef>
+          <a:fillRef idx="1">
+            <a:schemeClr val="lt1"/>
+          </a:fillRef>
+          <a:effectRef idx="0">
+            <a:schemeClr val="dk1"/>
+          </a:effectRef>
+          <a:fontRef idx="minor">
+            <a:schemeClr val="dk1"/>
+          </a:fontRef>
+        </p:style>
+        <p:txBody>
+          <a:bodyPr rtlCol="0" anchor="t"/>
+          <a:lstStyle/>
+          <a:p>
+            <a:pPr algn="ctr"/>
+            <a:r>
+              <a:rPr lang="en-US" sz="1200" dirty="0" smtClean="0"/>
+              <a:t>Feature binary </a:t>
+            </a:r>
+            <a:r>
+              <a:rPr lang="en-US" sz="1000" dirty="0" smtClean="0"/>
+              <a:t>(Kernel specific)</a:t>
+            </a:r>
+          </a:p>
+        </p:txBody>
+      </p:sp>
+      <p:pic>
+        <p:nvPicPr>
+          <p:cNvPr id="14" name="Picture 13"/>
+          <p:cNvPicPr>
+            <a:picLocks noChangeAspect="1"/>
+          </p:cNvPicPr>
+          <p:nvPr/>
+        </p:nvPicPr>
+        <p:blipFill rotWithShape="1">
+          <a:blip r:embed="rId2"/>
+          <a:srcRect t="1" b="5043"/>
+          <a:stretch/>
+        </p:blipFill>
+        <p:spPr>
+          <a:xfrm>
+            <a:off x="3621401" y="2095794"/>
+            <a:ext cx="1054249" cy="442338"/>
+          </a:xfrm>
+          <a:prstGeom prst="rect">
+            <a:avLst/>
+          </a:prstGeom>
+        </p:spPr>
+      </p:pic>
+      <p:sp>
+        <p:nvSpPr>
+          <p:cNvPr id="17" name="Rounded Rectangle 16"/>
+          <p:cNvSpPr/>
+          <p:nvPr/>
+        </p:nvSpPr>
+        <p:spPr>
+          <a:xfrm>
+            <a:off x="4211961" y="3170334"/>
+            <a:ext cx="2063568" cy="922633"/>
+          </a:xfrm>
+          <a:prstGeom prst="roundRect">
+            <a:avLst>
+              <a:gd name="adj" fmla="val 0"/>
+            </a:avLst>
+          </a:prstGeom>
+          <a:ln w="12700"/>
+        </p:spPr>
+        <p:style>
+          <a:lnRef idx="2">
+            <a:schemeClr val="dk1"/>
+          </a:lnRef>
+          <a:fillRef idx="1">
+            <a:schemeClr val="lt1"/>
+          </a:fillRef>
+          <a:effectRef idx="0">
+            <a:schemeClr val="dk1"/>
+          </a:effectRef>
+          <a:fontRef idx="minor">
+            <a:schemeClr val="dk1"/>
+          </a:fontRef>
+        </p:style>
+        <p:txBody>
+          <a:bodyPr rtlCol="0" anchor="t"/>
+          <a:lstStyle/>
+          <a:p>
+            <a:pPr algn="ctr"/>
+            <a:r>
+              <a:rPr lang="en-US" sz="1200" dirty="0" smtClean="0"/>
+              <a:t>Firmware Link</a:t>
+            </a:r>
+          </a:p>
+          <a:p>
+            <a:pPr algn="ctr"/>
+            <a:r>
+              <a:rPr lang="en-US" sz="1000" dirty="0" smtClean="0"/>
+              <a:t>(</a:t>
+            </a:r>
+            <a:r>
+              <a:rPr lang="en-US" sz="1000" dirty="0" err="1" smtClean="0"/>
+              <a:t>MicroEJ</a:t>
+            </a:r>
+            <a:r>
+              <a:rPr lang="en-US" sz="1000" dirty="0" smtClean="0"/>
+              <a:t> Tool)</a:t>
+            </a:r>
+            <a:endParaRPr lang="en-US" sz="1000" dirty="0"/>
+          </a:p>
+          <a:p>
+            <a:pPr algn="ctr"/>
+            <a:endParaRPr lang="en-US" sz="1200" dirty="0"/>
+          </a:p>
+        </p:txBody>
+      </p:sp>
+      <p:sp>
+        <p:nvSpPr>
+          <p:cNvPr id="19" name="Down Arrow 18"/>
+          <p:cNvSpPr/>
+          <p:nvPr/>
+        </p:nvSpPr>
+        <p:spPr>
+          <a:xfrm>
+            <a:off x="4436695" y="2885907"/>
+            <a:ext cx="167575" cy="243476"/>
+          </a:xfrm>
+          <a:prstGeom prst="downArrow">
+            <a:avLst/>
+          </a:prstGeom>
+          <a:ln>
+            <a:noFill/>
+          </a:ln>
+        </p:spPr>
+        <p:style>
+          <a:lnRef idx="2">
+            <a:schemeClr val="accent1">
+              <a:shade val="50000"/>
+            </a:schemeClr>
+          </a:lnRef>
+          <a:fillRef idx="1">
+            <a:schemeClr val="accent1"/>
+          </a:fillRef>
+          <a:effectRef idx="0">
+            <a:schemeClr val="accent1"/>
+          </a:effectRef>
+          <a:fontRef idx="minor">
+            <a:schemeClr val="lt1"/>
+          </a:fontRef>
+        </p:style>
+        <p:txBody>
+          <a:bodyPr rtlCol="0" anchor="ctr"/>
+          <a:lstStyle/>
+          <a:p>
+            <a:pPr algn="ctr"/>
+            <a:endParaRPr lang="en-US"/>
+          </a:p>
+        </p:txBody>
+      </p:sp>
+      <p:pic>
+        <p:nvPicPr>
+          <p:cNvPr id="20" name="Picture 19"/>
+          <p:cNvPicPr>
+            <a:picLocks noChangeAspect="1"/>
+          </p:cNvPicPr>
+          <p:nvPr/>
+        </p:nvPicPr>
+        <p:blipFill>
+          <a:blip r:embed="rId3"/>
+          <a:stretch>
+            <a:fillRect/>
+          </a:stretch>
+        </p:blipFill>
+        <p:spPr>
+          <a:xfrm>
+            <a:off x="4558046" y="3623354"/>
+            <a:ext cx="1409673" cy="375913"/>
+          </a:xfrm>
+          <a:prstGeom prst="rect">
+            <a:avLst/>
+          </a:prstGeom>
+        </p:spPr>
+      </p:pic>
+      <p:sp>
+        <p:nvSpPr>
+          <p:cNvPr id="21" name="Down Arrow 20"/>
+          <p:cNvSpPr/>
+          <p:nvPr/>
+        </p:nvSpPr>
+        <p:spPr>
+          <a:xfrm>
+            <a:off x="5159956" y="4164976"/>
+            <a:ext cx="167575" cy="243476"/>
+          </a:xfrm>
+          <a:prstGeom prst="downArrow">
+            <a:avLst/>
+          </a:prstGeom>
+          <a:ln>
+            <a:noFill/>
+          </a:ln>
+        </p:spPr>
+        <p:style>
+          <a:lnRef idx="2">
+            <a:schemeClr val="accent1">
+              <a:shade val="50000"/>
+            </a:schemeClr>
+          </a:lnRef>
+          <a:fillRef idx="1">
+            <a:schemeClr val="accent1"/>
+          </a:fillRef>
+          <a:effectRef idx="0">
+            <a:schemeClr val="accent1"/>
+          </a:effectRef>
+          <a:fontRef idx="minor">
+            <a:schemeClr val="lt1"/>
+          </a:fontRef>
+        </p:style>
+        <p:txBody>
+          <a:bodyPr rtlCol="0" anchor="ctr"/>
+          <a:lstStyle/>
+          <a:p>
+            <a:pPr algn="ctr"/>
+            <a:endParaRPr lang="en-US"/>
+          </a:p>
+        </p:txBody>
+      </p:sp>
+      <p:sp>
+        <p:nvSpPr>
+          <p:cNvPr id="22" name="Rounded Rectangle 21"/>
+          <p:cNvSpPr/>
+          <p:nvPr/>
+        </p:nvSpPr>
+        <p:spPr>
+          <a:xfrm>
+            <a:off x="4211960" y="4473328"/>
+            <a:ext cx="2063568" cy="756626"/>
+          </a:xfrm>
+          <a:prstGeom prst="roundRect">
+            <a:avLst/>
+          </a:prstGeom>
+          <a:ln/>
+        </p:spPr>
+        <p:style>
+          <a:lnRef idx="2">
+            <a:schemeClr val="dk1"/>
+          </a:lnRef>
+          <a:fillRef idx="1">
+            <a:schemeClr val="lt1"/>
+          </a:fillRef>
+          <a:effectRef idx="0">
+            <a:schemeClr val="dk1"/>
+          </a:effectRef>
+          <a:fontRef idx="minor">
+            <a:schemeClr val="dk1"/>
+          </a:fontRef>
+        </p:style>
+        <p:txBody>
+          <a:bodyPr rtlCol="0" anchor="ctr"/>
+          <a:lstStyle/>
+          <a:p>
+            <a:pPr algn="ctr">
+              <a:lnSpc>
+                <a:spcPct val="150000"/>
+              </a:lnSpc>
+            </a:pPr>
+            <a:r>
+              <a:rPr lang="en-US" sz="1200" dirty="0" smtClean="0"/>
+              <a:t>Firmware binary </a:t>
+            </a:r>
+          </a:p>
+          <a:p>
+            <a:pPr algn="ctr">
+              <a:lnSpc>
+                <a:spcPct val="150000"/>
+              </a:lnSpc>
+            </a:pPr>
+            <a:r>
+              <a:rPr lang="en-US" sz="1200" dirty="0" err="1" smtClean="0">
+                <a:latin typeface="Consolas" panose="020B0609020204030204" pitchFamily="49" charset="0"/>
+              </a:rPr>
+              <a:t>firmware.out</a:t>
+            </a:r>
+            <a:endParaRPr lang="en-US" sz="1200" dirty="0" smtClean="0"/>
+          </a:p>
+          <a:p>
+            <a:pPr algn="ctr">
+              <a:lnSpc>
+                <a:spcPct val="150000"/>
+              </a:lnSpc>
+            </a:pPr>
+            <a:r>
+              <a:rPr lang="en-US" sz="1000" dirty="0" smtClean="0"/>
+              <a:t>(Kernel + </a:t>
+            </a:r>
+            <a:r>
+              <a:rPr lang="en-US" sz="1000" dirty="0" smtClean="0"/>
+              <a:t>System Application</a:t>
+            </a:r>
+            <a:r>
+              <a:rPr lang="en-US" sz="1000" dirty="0" smtClean="0"/>
+              <a:t>)</a:t>
+            </a:r>
+          </a:p>
+        </p:txBody>
+      </p:sp>
+      <p:sp>
+        <p:nvSpPr>
+          <p:cNvPr id="24" name="TextBox 23"/>
+          <p:cNvSpPr txBox="1"/>
+          <p:nvPr/>
+        </p:nvSpPr>
+        <p:spPr>
+          <a:xfrm>
+            <a:off x="1897510" y="260648"/>
+            <a:ext cx="6880666" cy="461665"/>
+          </a:xfrm>
+          <a:prstGeom prst="rect">
+            <a:avLst/>
+          </a:prstGeom>
+          <a:noFill/>
+        </p:spPr>
+        <p:txBody>
+          <a:bodyPr wrap="none" rtlCol="0">
+            <a:spAutoFit/>
+          </a:bodyPr>
+          <a:lstStyle/>
+          <a:p>
+            <a:r>
+              <a:rPr lang="en-US" sz="2400" dirty="0" smtClean="0"/>
+              <a:t>build_flow_zoom_workspace_firmare_linker_only.png</a:t>
+            </a:r>
+            <a:endParaRPr lang="en-US" sz="2400" dirty="0"/>
+          </a:p>
+        </p:txBody>
+      </p:sp>
+      <p:sp>
+        <p:nvSpPr>
+          <p:cNvPr id="25" name="Down Arrow 24"/>
+          <p:cNvSpPr/>
+          <p:nvPr/>
+        </p:nvSpPr>
+        <p:spPr>
+          <a:xfrm>
+            <a:off x="5948603" y="2894420"/>
+            <a:ext cx="167575" cy="243476"/>
+          </a:xfrm>
+          <a:prstGeom prst="downArrow">
+            <a:avLst/>
+          </a:prstGeom>
+          <a:ln>
+            <a:noFill/>
+          </a:ln>
+        </p:spPr>
+        <p:style>
+          <a:lnRef idx="2">
+            <a:schemeClr val="accent1">
+              <a:shade val="50000"/>
+            </a:schemeClr>
+          </a:lnRef>
+          <a:fillRef idx="1">
+            <a:schemeClr val="accent1"/>
+          </a:fillRef>
+          <a:effectRef idx="0">
+            <a:schemeClr val="accent1"/>
+          </a:effectRef>
+          <a:fontRef idx="minor">
+            <a:schemeClr val="lt1"/>
+          </a:fontRef>
+        </p:style>
+        <p:txBody>
+          <a:bodyPr rtlCol="0" anchor="ctr"/>
+          <a:lstStyle/>
+          <a:p>
+            <a:pPr algn="ctr"/>
+            <a:endParaRPr lang="en-US"/>
+          </a:p>
+        </p:txBody>
+      </p:sp>
+    </p:spTree>
+    <p:extLst>
+      <p:ext uri="{BB962C8B-B14F-4D97-AF65-F5344CB8AC3E}">
+        <p14:creationId xmlns:p14="http://schemas.microsoft.com/office/powerpoint/2010/main" val="2574355277"/>
       </p:ext>
     </p:extLst>
   </p:cSld>

</xml_diff>